<commit_message>
ppt update + css fixes
</commit_message>
<xml_diff>
--- a/FantasyTetrisGame.pptx
+++ b/FantasyTetrisGame.pptx
@@ -110,6 +110,11 @@
       </a:defRPr>
     </a:lvl9pPr>
   </p:defaultTextStyle>
+  <p:extLst>
+    <p:ext uri="{EFAFB233-063F-42B5-8137-9DF3F51BA10A}">
+      <p15:sldGuideLst xmlns:p15="http://schemas.microsoft.com/office/powerpoint/2012/main"/>
+    </p:ext>
+  </p:extLst>
 </p:presentation>
 </file>
 
@@ -155,7 +160,7 @@
           </a:lstStyle>
           <a:p>
             <a:r>
-              <a:rPr lang="hu-HU" smtClean="0"/>
+              <a:rPr lang="hu-HU"/>
               <a:t>Mintacím szerkesztése</a:t>
             </a:r>
             <a:endParaRPr lang="en-US" dirty="0"/>
@@ -275,7 +280,7 @@
           </a:lstStyle>
           <a:p>
             <a:r>
-              <a:rPr lang="hu-HU" smtClean="0"/>
+              <a:rPr lang="hu-HU"/>
               <a:t>Kattintson ide az alcím mintájának szerkesztéséhez</a:t>
             </a:r>
             <a:endParaRPr lang="en-US" dirty="0"/>
@@ -404,7 +409,7 @@
           </a:lstStyle>
           <a:p>
             <a:r>
-              <a:rPr lang="hu-HU" smtClean="0"/>
+              <a:rPr lang="hu-HU"/>
               <a:t>Mintacím szerkesztése</a:t>
             </a:r>
             <a:endParaRPr lang="en-US" dirty="0"/>
@@ -483,7 +488,7 @@
           </a:lstStyle>
           <a:p>
             <a:r>
-              <a:rPr lang="hu-HU" smtClean="0"/>
+              <a:rPr lang="hu-HU"/>
               <a:t>Kép beszúrásához kattintson az ikonra</a:t>
             </a:r>
             <a:endParaRPr lang="en-US" dirty="0"/>
@@ -551,7 +556,7 @@
           <a:p>
             <a:pPr lvl="0"/>
             <a:r>
-              <a:rPr lang="hu-HU" smtClean="0"/>
+              <a:rPr lang="hu-HU"/>
               <a:t>Mintaszöveg szerkesztése</a:t>
             </a:r>
           </a:p>
@@ -677,7 +682,7 @@
           </a:lstStyle>
           <a:p>
             <a:r>
-              <a:rPr lang="hu-HU" smtClean="0"/>
+              <a:rPr lang="hu-HU"/>
               <a:t>Mintacím szerkesztése</a:t>
             </a:r>
             <a:endParaRPr lang="en-US" dirty="0"/>
@@ -745,7 +750,7 @@
           <a:p>
             <a:pPr lvl="0"/>
             <a:r>
-              <a:rPr lang="hu-HU" smtClean="0"/>
+              <a:rPr lang="hu-HU"/>
               <a:t>Mintaszöveg szerkesztése</a:t>
             </a:r>
           </a:p>
@@ -871,7 +876,7 @@
           </a:lstStyle>
           <a:p>
             <a:r>
-              <a:rPr lang="hu-HU" smtClean="0"/>
+              <a:rPr lang="hu-HU"/>
               <a:t>Mintacím szerkesztése</a:t>
             </a:r>
             <a:endParaRPr lang="en-US" dirty="0"/>
@@ -951,7 +956,7 @@
               <a:buNone/>
             </a:pPr>
             <a:r>
-              <a:rPr lang="hu-HU" smtClean="0"/>
+              <a:rPr lang="hu-HU"/>
               <a:t>Mintaszöveg szerkesztése</a:t>
             </a:r>
           </a:p>
@@ -1018,7 +1023,7 @@
           <a:p>
             <a:pPr lvl="0"/>
             <a:r>
-              <a:rPr lang="hu-HU" smtClean="0"/>
+              <a:rPr lang="hu-HU"/>
               <a:t>Mintaszöveg szerkesztése</a:t>
             </a:r>
           </a:p>
@@ -1238,7 +1243,7 @@
           </a:lstStyle>
           <a:p>
             <a:r>
-              <a:rPr lang="hu-HU" smtClean="0"/>
+              <a:rPr lang="hu-HU"/>
               <a:t>Mintacím szerkesztése</a:t>
             </a:r>
             <a:endParaRPr lang="en-US" dirty="0"/>
@@ -1359,7 +1364,7 @@
           <a:p>
             <a:pPr lvl="0"/>
             <a:r>
-              <a:rPr lang="hu-HU" smtClean="0"/>
+              <a:rPr lang="hu-HU"/>
               <a:t>Mintaszöveg szerkesztése</a:t>
             </a:r>
           </a:p>
@@ -1480,7 +1485,7 @@
           </a:lstStyle>
           <a:p>
             <a:r>
-              <a:rPr lang="hu-HU" smtClean="0"/>
+              <a:rPr lang="hu-HU"/>
               <a:t>Mintacím szerkesztése</a:t>
             </a:r>
             <a:endParaRPr lang="en-US" dirty="0"/>
@@ -1555,7 +1560,7 @@
           <a:p>
             <a:pPr lvl="0"/>
             <a:r>
-              <a:rPr lang="hu-HU" smtClean="0"/>
+              <a:rPr lang="hu-HU"/>
               <a:t>Mintaszöveg szerkesztése</a:t>
             </a:r>
           </a:p>
@@ -1622,7 +1627,7 @@
           <a:p>
             <a:pPr lvl="0"/>
             <a:r>
-              <a:rPr lang="hu-HU" smtClean="0"/>
+              <a:rPr lang="hu-HU"/>
               <a:t>Mintaszöveg szerkesztése</a:t>
             </a:r>
           </a:p>
@@ -1696,7 +1701,7 @@
           <a:p>
             <a:pPr lvl="0"/>
             <a:r>
-              <a:rPr lang="hu-HU" smtClean="0"/>
+              <a:rPr lang="hu-HU"/>
               <a:t>Mintaszöveg szerkesztése</a:t>
             </a:r>
           </a:p>
@@ -1763,7 +1768,7 @@
           <a:p>
             <a:pPr lvl="0"/>
             <a:r>
-              <a:rPr lang="hu-HU" smtClean="0"/>
+              <a:rPr lang="hu-HU"/>
               <a:t>Mintaszöveg szerkesztése</a:t>
             </a:r>
           </a:p>
@@ -1837,7 +1842,7 @@
           <a:p>
             <a:pPr lvl="0"/>
             <a:r>
-              <a:rPr lang="hu-HU" smtClean="0"/>
+              <a:rPr lang="hu-HU"/>
               <a:t>Mintaszöveg szerkesztése</a:t>
             </a:r>
           </a:p>
@@ -1904,7 +1909,7 @@
           <a:p>
             <a:pPr lvl="0"/>
             <a:r>
-              <a:rPr lang="hu-HU" smtClean="0"/>
+              <a:rPr lang="hu-HU"/>
               <a:t>Mintaszöveg szerkesztése</a:t>
             </a:r>
           </a:p>
@@ -2103,7 +2108,7 @@
           </a:lstStyle>
           <a:p>
             <a:r>
-              <a:rPr lang="hu-HU" smtClean="0"/>
+              <a:rPr lang="hu-HU"/>
               <a:t>Mintacím szerkesztése</a:t>
             </a:r>
             <a:endParaRPr lang="en-US" dirty="0"/>
@@ -2178,7 +2183,7 @@
           <a:p>
             <a:pPr lvl="0"/>
             <a:r>
-              <a:rPr lang="hu-HU" smtClean="0"/>
+              <a:rPr lang="hu-HU"/>
               <a:t>Mintaszöveg szerkesztése</a:t>
             </a:r>
           </a:p>
@@ -2256,7 +2261,7 @@
           </a:lstStyle>
           <a:p>
             <a:r>
-              <a:rPr lang="hu-HU" smtClean="0"/>
+              <a:rPr lang="hu-HU"/>
               <a:t>Kép beszúrásához kattintson az ikonra</a:t>
             </a:r>
             <a:endParaRPr lang="en-US" dirty="0"/>
@@ -2324,7 +2329,7 @@
           <a:p>
             <a:pPr lvl="0"/>
             <a:r>
-              <a:rPr lang="hu-HU" smtClean="0"/>
+              <a:rPr lang="hu-HU"/>
               <a:t>Mintaszöveg szerkesztése</a:t>
             </a:r>
           </a:p>
@@ -2398,7 +2403,7 @@
           <a:p>
             <a:pPr lvl="0"/>
             <a:r>
-              <a:rPr lang="hu-HU" smtClean="0"/>
+              <a:rPr lang="hu-HU"/>
               <a:t>Mintaszöveg szerkesztése</a:t>
             </a:r>
           </a:p>
@@ -2476,7 +2481,7 @@
           </a:lstStyle>
           <a:p>
             <a:r>
-              <a:rPr lang="hu-HU" smtClean="0"/>
+              <a:rPr lang="hu-HU"/>
               <a:t>Kép beszúrásához kattintson az ikonra</a:t>
             </a:r>
             <a:endParaRPr lang="en-US" dirty="0"/>
@@ -2544,7 +2549,7 @@
           <a:p>
             <a:pPr lvl="0"/>
             <a:r>
-              <a:rPr lang="hu-HU" smtClean="0"/>
+              <a:rPr lang="hu-HU"/>
               <a:t>Mintaszöveg szerkesztése</a:t>
             </a:r>
           </a:p>
@@ -2618,7 +2623,7 @@
           <a:p>
             <a:pPr lvl="0"/>
             <a:r>
-              <a:rPr lang="hu-HU" smtClean="0"/>
+              <a:rPr lang="hu-HU"/>
               <a:t>Mintaszöveg szerkesztése</a:t>
             </a:r>
           </a:p>
@@ -2696,7 +2701,7 @@
           </a:lstStyle>
           <a:p>
             <a:r>
-              <a:rPr lang="hu-HU" smtClean="0"/>
+              <a:rPr lang="hu-HU"/>
               <a:t>Kép beszúrásához kattintson az ikonra</a:t>
             </a:r>
             <a:endParaRPr lang="en-US" dirty="0"/>
@@ -2764,7 +2769,7 @@
           <a:p>
             <a:pPr lvl="0"/>
             <a:r>
-              <a:rPr lang="hu-HU" smtClean="0"/>
+              <a:rPr lang="hu-HU"/>
               <a:t>Mintaszöveg szerkesztése</a:t>
             </a:r>
           </a:p>
@@ -2959,7 +2964,7 @@
           <a:lstStyle/>
           <a:p>
             <a:r>
-              <a:rPr lang="hu-HU" smtClean="0"/>
+              <a:rPr lang="hu-HU"/>
               <a:t>Mintacím szerkesztése</a:t>
             </a:r>
             <a:endParaRPr lang="en-US" dirty="0"/>
@@ -2983,35 +2988,35 @@
           <a:p>
             <a:pPr lvl="0"/>
             <a:r>
-              <a:rPr lang="hu-HU" smtClean="0"/>
+              <a:rPr lang="hu-HU"/>
               <a:t>Mintaszöveg szerkesztése</a:t>
             </a:r>
           </a:p>
           <a:p>
             <a:pPr lvl="1"/>
             <a:r>
-              <a:rPr lang="hu-HU" smtClean="0"/>
+              <a:rPr lang="hu-HU"/>
               <a:t>Második szint</a:t>
             </a:r>
           </a:p>
           <a:p>
             <a:pPr lvl="2"/>
             <a:r>
-              <a:rPr lang="hu-HU" smtClean="0"/>
+              <a:rPr lang="hu-HU"/>
               <a:t>Harmadik szint</a:t>
             </a:r>
           </a:p>
           <a:p>
             <a:pPr lvl="3"/>
             <a:r>
-              <a:rPr lang="hu-HU" smtClean="0"/>
+              <a:rPr lang="hu-HU"/>
               <a:t>Negyedik szint</a:t>
             </a:r>
           </a:p>
           <a:p>
             <a:pPr lvl="4"/>
             <a:r>
-              <a:rPr lang="hu-HU" smtClean="0"/>
+              <a:rPr lang="hu-HU"/>
               <a:t>Ötödik szint</a:t>
             </a:r>
             <a:endParaRPr lang="en-US" dirty="0"/>
@@ -3134,7 +3139,7 @@
           <a:lstStyle/>
           <a:p>
             <a:r>
-              <a:rPr lang="hu-HU" smtClean="0"/>
+              <a:rPr lang="hu-HU"/>
               <a:t>Mintacím szerkesztése</a:t>
             </a:r>
             <a:endParaRPr lang="en-US" dirty="0"/>
@@ -3163,35 +3168,35 @@
           <a:p>
             <a:pPr lvl="0"/>
             <a:r>
-              <a:rPr lang="hu-HU" smtClean="0"/>
+              <a:rPr lang="hu-HU"/>
               <a:t>Mintaszöveg szerkesztése</a:t>
             </a:r>
           </a:p>
           <a:p>
             <a:pPr lvl="1"/>
             <a:r>
-              <a:rPr lang="hu-HU" smtClean="0"/>
+              <a:rPr lang="hu-HU"/>
               <a:t>Második szint</a:t>
             </a:r>
           </a:p>
           <a:p>
             <a:pPr lvl="2"/>
             <a:r>
-              <a:rPr lang="hu-HU" smtClean="0"/>
+              <a:rPr lang="hu-HU"/>
               <a:t>Harmadik szint</a:t>
             </a:r>
           </a:p>
           <a:p>
             <a:pPr lvl="3"/>
             <a:r>
-              <a:rPr lang="hu-HU" smtClean="0"/>
+              <a:rPr lang="hu-HU"/>
               <a:t>Negyedik szint</a:t>
             </a:r>
           </a:p>
           <a:p>
             <a:pPr lvl="4"/>
             <a:r>
-              <a:rPr lang="hu-HU" smtClean="0"/>
+              <a:rPr lang="hu-HU"/>
               <a:t>Ötödik szint</a:t>
             </a:r>
             <a:endParaRPr lang="en-US" dirty="0"/>
@@ -3309,7 +3314,7 @@
           <a:lstStyle/>
           <a:p>
             <a:r>
-              <a:rPr lang="hu-HU" smtClean="0"/>
+              <a:rPr lang="hu-HU"/>
               <a:t>Mintacím szerkesztése</a:t>
             </a:r>
             <a:endParaRPr lang="en-US" dirty="0"/>
@@ -3333,35 +3338,35 @@
           <a:p>
             <a:pPr lvl="0"/>
             <a:r>
-              <a:rPr lang="hu-HU" smtClean="0"/>
+              <a:rPr lang="hu-HU"/>
               <a:t>Mintaszöveg szerkesztése</a:t>
             </a:r>
           </a:p>
           <a:p>
             <a:pPr lvl="1"/>
             <a:r>
-              <a:rPr lang="hu-HU" smtClean="0"/>
+              <a:rPr lang="hu-HU"/>
               <a:t>Második szint</a:t>
             </a:r>
           </a:p>
           <a:p>
             <a:pPr lvl="2"/>
             <a:r>
-              <a:rPr lang="hu-HU" smtClean="0"/>
+              <a:rPr lang="hu-HU"/>
               <a:t>Harmadik szint</a:t>
             </a:r>
           </a:p>
           <a:p>
             <a:pPr lvl="3"/>
             <a:r>
-              <a:rPr lang="hu-HU" smtClean="0"/>
+              <a:rPr lang="hu-HU"/>
               <a:t>Negyedik szint</a:t>
             </a:r>
           </a:p>
           <a:p>
             <a:pPr lvl="4"/>
             <a:r>
-              <a:rPr lang="hu-HU" smtClean="0"/>
+              <a:rPr lang="hu-HU"/>
               <a:t>Ötödik szint</a:t>
             </a:r>
             <a:endParaRPr lang="en-US" dirty="0"/>
@@ -3488,7 +3493,7 @@
           </a:lstStyle>
           <a:p>
             <a:r>
-              <a:rPr lang="hu-HU" smtClean="0"/>
+              <a:rPr lang="hu-HU"/>
               <a:t>Mintacím szerkesztése</a:t>
             </a:r>
             <a:endParaRPr lang="en-US" dirty="0"/>
@@ -3609,7 +3614,7 @@
           <a:p>
             <a:pPr lvl="0"/>
             <a:r>
-              <a:rPr lang="hu-HU" smtClean="0"/>
+              <a:rPr lang="hu-HU"/>
               <a:t>Mintaszöveg szerkesztése</a:t>
             </a:r>
           </a:p>
@@ -3726,7 +3731,7 @@
           <a:lstStyle/>
           <a:p>
             <a:r>
-              <a:rPr lang="hu-HU" smtClean="0"/>
+              <a:rPr lang="hu-HU"/>
               <a:t>Mintacím szerkesztése</a:t>
             </a:r>
             <a:endParaRPr lang="en-US" dirty="0"/>
@@ -3785,35 +3790,35 @@
           <a:p>
             <a:pPr lvl="0"/>
             <a:r>
-              <a:rPr lang="hu-HU" smtClean="0"/>
+              <a:rPr lang="hu-HU"/>
               <a:t>Mintaszöveg szerkesztése</a:t>
             </a:r>
           </a:p>
           <a:p>
             <a:pPr lvl="1"/>
             <a:r>
-              <a:rPr lang="hu-HU" smtClean="0"/>
+              <a:rPr lang="hu-HU"/>
               <a:t>Második szint</a:t>
             </a:r>
           </a:p>
           <a:p>
             <a:pPr lvl="2"/>
             <a:r>
-              <a:rPr lang="hu-HU" smtClean="0"/>
+              <a:rPr lang="hu-HU"/>
               <a:t>Harmadik szint</a:t>
             </a:r>
           </a:p>
           <a:p>
             <a:pPr lvl="3"/>
             <a:r>
-              <a:rPr lang="hu-HU" smtClean="0"/>
+              <a:rPr lang="hu-HU"/>
               <a:t>Negyedik szint</a:t>
             </a:r>
           </a:p>
           <a:p>
             <a:pPr lvl="4"/>
             <a:r>
-              <a:rPr lang="hu-HU" smtClean="0"/>
+              <a:rPr lang="hu-HU"/>
               <a:t>Ötödik szint</a:t>
             </a:r>
             <a:endParaRPr lang="en-US" dirty="0"/>
@@ -3872,35 +3877,35 @@
           <a:p>
             <a:pPr lvl="0"/>
             <a:r>
-              <a:rPr lang="hu-HU" smtClean="0"/>
+              <a:rPr lang="hu-HU"/>
               <a:t>Mintaszöveg szerkesztése</a:t>
             </a:r>
           </a:p>
           <a:p>
             <a:pPr lvl="1"/>
             <a:r>
-              <a:rPr lang="hu-HU" smtClean="0"/>
+              <a:rPr lang="hu-HU"/>
               <a:t>Második szint</a:t>
             </a:r>
           </a:p>
           <a:p>
             <a:pPr lvl="2"/>
             <a:r>
-              <a:rPr lang="hu-HU" smtClean="0"/>
+              <a:rPr lang="hu-HU"/>
               <a:t>Harmadik szint</a:t>
             </a:r>
           </a:p>
           <a:p>
             <a:pPr lvl="3"/>
             <a:r>
-              <a:rPr lang="hu-HU" smtClean="0"/>
+              <a:rPr lang="hu-HU"/>
               <a:t>Negyedik szint</a:t>
             </a:r>
           </a:p>
           <a:p>
             <a:pPr lvl="4"/>
             <a:r>
-              <a:rPr lang="hu-HU" smtClean="0"/>
+              <a:rPr lang="hu-HU"/>
               <a:t>Ötödik szint</a:t>
             </a:r>
             <a:endParaRPr lang="en-US" dirty="0"/>
@@ -4022,7 +4027,7 @@
           </a:lstStyle>
           <a:p>
             <a:r>
-              <a:rPr lang="hu-HU" smtClean="0"/>
+              <a:rPr lang="hu-HU"/>
               <a:t>Mintacím szerkesztése</a:t>
             </a:r>
             <a:endParaRPr lang="en-US" dirty="0"/>
@@ -4097,7 +4102,7 @@
           <a:p>
             <a:pPr lvl="0"/>
             <a:r>
-              <a:rPr lang="hu-HU" smtClean="0"/>
+              <a:rPr lang="hu-HU"/>
               <a:t>Mintaszöveg szerkesztése</a:t>
             </a:r>
           </a:p>
@@ -4155,35 +4160,35 @@
           <a:p>
             <a:pPr lvl="0"/>
             <a:r>
-              <a:rPr lang="hu-HU" smtClean="0"/>
+              <a:rPr lang="hu-HU"/>
               <a:t>Mintaszöveg szerkesztése</a:t>
             </a:r>
           </a:p>
           <a:p>
             <a:pPr lvl="1"/>
             <a:r>
-              <a:rPr lang="hu-HU" smtClean="0"/>
+              <a:rPr lang="hu-HU"/>
               <a:t>Második szint</a:t>
             </a:r>
           </a:p>
           <a:p>
             <a:pPr lvl="2"/>
             <a:r>
-              <a:rPr lang="hu-HU" smtClean="0"/>
+              <a:rPr lang="hu-HU"/>
               <a:t>Harmadik szint</a:t>
             </a:r>
           </a:p>
           <a:p>
             <a:pPr lvl="3"/>
             <a:r>
-              <a:rPr lang="hu-HU" smtClean="0"/>
+              <a:rPr lang="hu-HU"/>
               <a:t>Negyedik szint</a:t>
             </a:r>
           </a:p>
           <a:p>
             <a:pPr lvl="4"/>
             <a:r>
-              <a:rPr lang="hu-HU" smtClean="0"/>
+              <a:rPr lang="hu-HU"/>
               <a:t>Ötödik szint</a:t>
             </a:r>
             <a:endParaRPr lang="en-US" dirty="0"/>
@@ -4258,7 +4263,7 @@
           <a:p>
             <a:pPr lvl="0"/>
             <a:r>
-              <a:rPr lang="hu-HU" smtClean="0"/>
+              <a:rPr lang="hu-HU"/>
               <a:t>Mintaszöveg szerkesztése</a:t>
             </a:r>
           </a:p>
@@ -4316,35 +4321,35 @@
           <a:p>
             <a:pPr lvl="0"/>
             <a:r>
-              <a:rPr lang="hu-HU" smtClean="0"/>
+              <a:rPr lang="hu-HU"/>
               <a:t>Mintaszöveg szerkesztése</a:t>
             </a:r>
           </a:p>
           <a:p>
             <a:pPr lvl="1"/>
             <a:r>
-              <a:rPr lang="hu-HU" smtClean="0"/>
+              <a:rPr lang="hu-HU"/>
               <a:t>Második szint</a:t>
             </a:r>
           </a:p>
           <a:p>
             <a:pPr lvl="2"/>
             <a:r>
-              <a:rPr lang="hu-HU" smtClean="0"/>
+              <a:rPr lang="hu-HU"/>
               <a:t>Harmadik szint</a:t>
             </a:r>
           </a:p>
           <a:p>
             <a:pPr lvl="3"/>
             <a:r>
-              <a:rPr lang="hu-HU" smtClean="0"/>
+              <a:rPr lang="hu-HU"/>
               <a:t>Negyedik szint</a:t>
             </a:r>
           </a:p>
           <a:p>
             <a:pPr lvl="4"/>
             <a:r>
-              <a:rPr lang="hu-HU" smtClean="0"/>
+              <a:rPr lang="hu-HU"/>
               <a:t>Ötödik szint</a:t>
             </a:r>
             <a:endParaRPr lang="en-US" dirty="0"/>
@@ -4462,7 +4467,7 @@
           <a:lstStyle/>
           <a:p>
             <a:r>
-              <a:rPr lang="hu-HU" smtClean="0"/>
+              <a:rPr lang="hu-HU"/>
               <a:t>Mintacím szerkesztése</a:t>
             </a:r>
             <a:endParaRPr lang="en-US" dirty="0"/>
@@ -4684,7 +4689,7 @@
           </a:lstStyle>
           <a:p>
             <a:r>
-              <a:rPr lang="hu-HU" smtClean="0"/>
+              <a:rPr lang="hu-HU"/>
               <a:t>Mintacím szerkesztése</a:t>
             </a:r>
             <a:endParaRPr lang="en-US" dirty="0"/>
@@ -4743,35 +4748,35 @@
           <a:p>
             <a:pPr lvl="0"/>
             <a:r>
-              <a:rPr lang="hu-HU" smtClean="0"/>
+              <a:rPr lang="hu-HU"/>
               <a:t>Mintaszöveg szerkesztése</a:t>
             </a:r>
           </a:p>
           <a:p>
             <a:pPr lvl="1"/>
             <a:r>
-              <a:rPr lang="hu-HU" smtClean="0"/>
+              <a:rPr lang="hu-HU"/>
               <a:t>Második szint</a:t>
             </a:r>
           </a:p>
           <a:p>
             <a:pPr lvl="2"/>
             <a:r>
-              <a:rPr lang="hu-HU" smtClean="0"/>
+              <a:rPr lang="hu-HU"/>
               <a:t>Harmadik szint</a:t>
             </a:r>
           </a:p>
           <a:p>
             <a:pPr lvl="3"/>
             <a:r>
-              <a:rPr lang="hu-HU" smtClean="0"/>
+              <a:rPr lang="hu-HU"/>
               <a:t>Negyedik szint</a:t>
             </a:r>
           </a:p>
           <a:p>
             <a:pPr lvl="4"/>
             <a:r>
-              <a:rPr lang="hu-HU" smtClean="0"/>
+              <a:rPr lang="hu-HU"/>
               <a:t>Ötödik szint</a:t>
             </a:r>
             <a:endParaRPr lang="en-US" dirty="0"/>
@@ -4837,7 +4842,7 @@
           <a:p>
             <a:pPr lvl="0"/>
             <a:r>
-              <a:rPr lang="hu-HU" smtClean="0"/>
+              <a:rPr lang="hu-HU"/>
               <a:t>Mintaszöveg szerkesztése</a:t>
             </a:r>
           </a:p>
@@ -4965,7 +4970,7 @@
           </a:lstStyle>
           <a:p>
             <a:r>
-              <a:rPr lang="hu-HU" smtClean="0"/>
+              <a:rPr lang="hu-HU"/>
               <a:t>Mintacím szerkesztése</a:t>
             </a:r>
             <a:endParaRPr lang="en-US" dirty="0"/>
@@ -5044,7 +5049,7 @@
           </a:lstStyle>
           <a:p>
             <a:r>
-              <a:rPr lang="hu-HU" smtClean="0"/>
+              <a:rPr lang="hu-HU"/>
               <a:t>Kép beszúrásához kattintson az ikonra</a:t>
             </a:r>
             <a:endParaRPr lang="en-US" dirty="0"/>
@@ -5112,7 +5117,7 @@
           <a:p>
             <a:pPr lvl="0"/>
             <a:r>
-              <a:rPr lang="hu-HU" smtClean="0"/>
+              <a:rPr lang="hu-HU"/>
               <a:t>Mintaszöveg szerkesztése</a:t>
             </a:r>
           </a:p>
@@ -5459,7 +5464,7 @@
           <a:lstStyle/>
           <a:p>
             <a:r>
-              <a:rPr lang="hu-HU" smtClean="0"/>
+              <a:rPr lang="hu-HU"/>
               <a:t>Mintacím szerkesztése</a:t>
             </a:r>
             <a:endParaRPr lang="en-US" dirty="0"/>
@@ -5493,35 +5498,35 @@
           <a:p>
             <a:pPr lvl="0"/>
             <a:r>
-              <a:rPr lang="hu-HU" smtClean="0"/>
+              <a:rPr lang="hu-HU"/>
               <a:t>Mintaszöveg szerkesztése</a:t>
             </a:r>
           </a:p>
           <a:p>
             <a:pPr lvl="1"/>
             <a:r>
-              <a:rPr lang="hu-HU" smtClean="0"/>
+              <a:rPr lang="hu-HU"/>
               <a:t>Második szint</a:t>
             </a:r>
           </a:p>
           <a:p>
             <a:pPr lvl="2"/>
             <a:r>
-              <a:rPr lang="hu-HU" smtClean="0"/>
+              <a:rPr lang="hu-HU"/>
               <a:t>Harmadik szint</a:t>
             </a:r>
           </a:p>
           <a:p>
             <a:pPr lvl="3"/>
             <a:r>
-              <a:rPr lang="hu-HU" smtClean="0"/>
+              <a:rPr lang="hu-HU"/>
               <a:t>Negyedik szint</a:t>
             </a:r>
           </a:p>
           <a:p>
             <a:pPr lvl="4"/>
             <a:r>
-              <a:rPr lang="hu-HU" smtClean="0"/>
+              <a:rPr lang="hu-HU"/>
               <a:t>Ötödik szint</a:t>
             </a:r>
             <a:endParaRPr lang="en-US" dirty="0"/>
@@ -6108,19 +6113,19 @@
           <a:lstStyle/>
           <a:p>
             <a:r>
-              <a:rPr lang="hu-HU" b="1" dirty="0" err="1" smtClean="0"/>
+              <a:rPr lang="hu-HU" b="1" dirty="0" err="1"/>
               <a:t>Fantasy</a:t>
             </a:r>
             <a:r>
-              <a:rPr lang="hu-HU" b="1" dirty="0" smtClean="0"/>
+              <a:rPr lang="hu-HU" b="1" dirty="0"/>
               <a:t>-</a:t>
             </a:r>
             <a:r>
-              <a:rPr lang="hu-HU" b="1" dirty="0" err="1" smtClean="0"/>
+              <a:rPr lang="hu-HU" b="1" dirty="0" err="1"/>
               <a:t>Tetris</a:t>
             </a:r>
             <a:r>
-              <a:rPr lang="hu-HU" b="1" dirty="0" smtClean="0"/>
+              <a:rPr lang="hu-HU" b="1" dirty="0"/>
               <a:t>-Game</a:t>
             </a:r>
             <a:endParaRPr lang="hu-HU" dirty="0"/>
@@ -6142,7 +6147,10 @@
           <a:bodyPr/>
           <a:lstStyle/>
           <a:p>
-            <a:endParaRPr lang="hu-HU" dirty="0"/>
+            <a:r>
+              <a:rPr lang="hu-HU" dirty="0"/>
+              <a:t>ALCÍM BEIRÁSÁHOZ KATTINTSON IDE</a:t>
+            </a:r>
           </a:p>
         </p:txBody>
       </p:sp>
@@ -6156,13 +6164,6 @@
   <p:clrMapOvr>
     <a:masterClrMapping/>
   </p:clrMapOvr>
-  <p:timing>
-    <p:tnLst>
-      <p:par>
-        <p:cTn id="1" dur="indefinite" restart="never" nodeType="tmRoot"/>
-      </p:par>
-    </p:tnLst>
-  </p:timing>
 </p:sld>
 </file>
 
@@ -6199,10 +6200,9 @@
           <a:lstStyle/>
           <a:p>
             <a:r>
-              <a:rPr lang="hu-HU" dirty="0" smtClean="0"/>
+              <a:rPr lang="hu-HU" dirty="0"/>
               <a:t>Csapat</a:t>
             </a:r>
-            <a:endParaRPr lang="hu-HU" dirty="0"/>
           </a:p>
         </p:txBody>
       </p:sp>
@@ -6222,22 +6222,21 @@
           <a:lstStyle/>
           <a:p>
             <a:r>
-              <a:rPr lang="hu-HU" dirty="0" smtClean="0"/>
+              <a:rPr lang="hu-HU" dirty="0"/>
               <a:t>Pécsi Bálint</a:t>
             </a:r>
           </a:p>
           <a:p>
             <a:r>
-              <a:rPr lang="hu-HU" dirty="0" smtClean="0"/>
+              <a:rPr lang="hu-HU" dirty="0"/>
               <a:t>Szabó Taddeus</a:t>
             </a:r>
           </a:p>
           <a:p>
             <a:r>
-              <a:rPr lang="hu-HU" dirty="0" smtClean="0"/>
+              <a:rPr lang="hu-HU" dirty="0"/>
               <a:t>Papp Zsombor</a:t>
             </a:r>
-            <a:endParaRPr lang="hu-HU" dirty="0"/>
           </a:p>
         </p:txBody>
       </p:sp>
@@ -6251,13 +6250,6 @@
   <p:clrMapOvr>
     <a:masterClrMapping/>
   </p:clrMapOvr>
-  <p:timing>
-    <p:tnLst>
-      <p:par>
-        <p:cTn id="1" dur="indefinite" restart="never" nodeType="tmRoot"/>
-      </p:par>
-    </p:tnLst>
-  </p:timing>
 </p:sld>
 </file>
 
@@ -6294,10 +6286,9 @@
           <a:lstStyle/>
           <a:p>
             <a:r>
-              <a:rPr lang="hu-HU" dirty="0" smtClean="0"/>
+              <a:rPr lang="hu-HU" dirty="0"/>
               <a:t>Ötlet</a:t>
             </a:r>
-            <a:endParaRPr lang="hu-HU" dirty="0"/>
           </a:p>
         </p:txBody>
       </p:sp>
@@ -6322,18 +6313,17 @@
           <a:lstStyle/>
           <a:p>
             <a:r>
-              <a:rPr lang="hu-HU" b="1" dirty="0" smtClean="0"/>
+              <a:rPr lang="hu-HU" b="1" dirty="0"/>
               <a:t>Egy játék ami olyan mint a </a:t>
             </a:r>
             <a:r>
-              <a:rPr lang="hu-HU" b="1" dirty="0" err="1" smtClean="0"/>
+              <a:rPr lang="hu-HU" b="1" dirty="0" err="1"/>
               <a:t>tetris</a:t>
             </a:r>
             <a:r>
-              <a:rPr lang="hu-HU" b="1" dirty="0" smtClean="0"/>
+              <a:rPr lang="hu-HU" b="1" dirty="0"/>
               <a:t>, de egészen más</a:t>
             </a:r>
-            <a:endParaRPr lang="hu-HU" b="1" dirty="0"/>
           </a:p>
         </p:txBody>
       </p:sp>
@@ -6377,13 +6367,6 @@
   <p:clrMapOvr>
     <a:masterClrMapping/>
   </p:clrMapOvr>
-  <p:timing>
-    <p:tnLst>
-      <p:par>
-        <p:cTn id="1" dur="indefinite" restart="never" nodeType="tmRoot"/>
-      </p:par>
-    </p:tnLst>
-  </p:timing>
 </p:sld>
 </file>
 
@@ -6420,10 +6403,9 @@
           <a:lstStyle/>
           <a:p>
             <a:r>
-              <a:rPr lang="hu-HU" dirty="0" smtClean="0"/>
+              <a:rPr lang="hu-HU" dirty="0"/>
               <a:t>A játék menete</a:t>
             </a:r>
-            <a:endParaRPr lang="hu-HU" dirty="0"/>
           </a:p>
         </p:txBody>
       </p:sp>
@@ -6453,20 +6435,11 @@
               <a:rPr lang="hu-HU" dirty="0"/>
               <a:t> </a:t>
             </a:r>
-            <a:endParaRPr lang="hu-HU" dirty="0" smtClean="0"/>
-          </a:p>
-          <a:p>
-            <a:r>
-              <a:rPr lang="hu-HU" dirty="0" smtClean="0"/>
-              <a:t>A </a:t>
-            </a:r>
+          </a:p>
+          <a:p>
             <a:r>
               <a:rPr lang="hu-HU" dirty="0"/>
-              <a:t>játékosok felváltva lépnek</a:t>
-            </a:r>
-            <a:r>
-              <a:rPr lang="hu-HU" dirty="0" smtClean="0"/>
-              <a:t>.</a:t>
+              <a:t>A játékosok felváltva lépnek.</a:t>
             </a:r>
           </a:p>
           <a:p>
@@ -6500,7 +6473,7 @@
           <a:p>
             <a:r>
               <a:rPr lang="hu-HU" dirty="0"/>
-              <a:t>Behelyezi a játéktáblára a </a:t>
+              <a:t>Lehelyezi a játéktáblára a </a:t>
             </a:r>
             <a:r>
               <a:rPr lang="hu-HU" dirty="0" err="1"/>
@@ -6508,13 +6481,7 @@
             </a:r>
             <a:r>
               <a:rPr lang="hu-HU" dirty="0"/>
-              <a:t> alakzatot, ami a kártyán van</a:t>
-            </a:r>
-          </a:p>
-          <a:p>
-            <a:r>
-              <a:rPr lang="hu-HU" dirty="0"/>
-              <a:t>Végrehajtja a bónusz akciókat, ha van</a:t>
+              <a:t> alakzatot, ami a kártyán van, vagy passzol</a:t>
             </a:r>
           </a:p>
           <a:p>
@@ -6538,13 +6505,6 @@
   <p:clrMapOvr>
     <a:masterClrMapping/>
   </p:clrMapOvr>
-  <p:timing>
-    <p:tnLst>
-      <p:par>
-        <p:cTn id="1" dur="indefinite" restart="never" nodeType="tmRoot"/>
-      </p:par>
-    </p:tnLst>
-  </p:timing>
 </p:sld>
 </file>
 
@@ -6583,7 +6543,7 @@
         </p:spPr>
         <p:txBody>
           <a:bodyPr>
-            <a:normAutofit fontScale="92500" lnSpcReduction="10000"/>
+            <a:normAutofit/>
           </a:bodyPr>
           <a:lstStyle/>
           <a:p>
@@ -6615,44 +6575,15 @@
               <a:rPr lang="hu-HU" dirty="0"/>
               <a:t>Minden egyes négyzetnek van saját fajtája (kép/alakzat)</a:t>
             </a:r>
-          </a:p>
-          <a:p>
-            <a:r>
-              <a:rPr lang="hu-HU" dirty="0"/>
-              <a:t>Egy különleges effekt, amely használható a sikeres lehelyezéskor (Nézd meg a “Lehelyezés szabályai”-t)</a:t>
-            </a:r>
-          </a:p>
-          <a:p>
-            <a:r>
-              <a:rPr lang="hu-HU" dirty="0"/>
-              <a:t>A lehelyezés sikeres ha a </a:t>
-            </a:r>
-            <a:r>
-              <a:rPr lang="hu-HU" dirty="0" err="1"/>
-              <a:t>tetris</a:t>
-            </a:r>
-            <a:r>
-              <a:rPr lang="hu-HU" dirty="0"/>
-              <a:t> alakzat rá-helyezhető a táblára</a:t>
-            </a:r>
+            <a:endParaRPr lang="hu-HU" b="1" dirty="0"/>
           </a:p>
           <a:p>
             <a:pPr marL="0" indent="0">
               <a:buNone/>
             </a:pPr>
-            <a:endParaRPr lang="hu-HU" b="1" dirty="0" smtClean="0"/>
-          </a:p>
-          <a:p>
-            <a:pPr marL="0" indent="0">
-              <a:buNone/>
-            </a:pPr>
-            <a:r>
-              <a:rPr lang="hu-HU" b="1" dirty="0" smtClean="0"/>
-              <a:t>Lehelyezés </a:t>
-            </a:r>
             <a:r>
               <a:rPr lang="hu-HU" b="1" dirty="0"/>
-              <a:t>szabályai:</a:t>
+              <a:t>Lehelyezés szabályai:</a:t>
             </a:r>
             <a:endParaRPr lang="hu-HU" dirty="0"/>
           </a:p>
@@ -6669,17 +6600,17 @@
             </a:r>
           </a:p>
           <a:p>
+            <a:pPr lvl="1"/>
             <a:r>
               <a:rPr lang="hu-HU" dirty="0"/>
-              <a:t>Ha nem tudjuk lerakni egyik kártyán lévő elemet se, akkor passzolnunk kell</a:t>
-            </a:r>
-            <a:r>
-              <a:rPr lang="hu-HU" dirty="0" smtClean="0"/>
-              <a:t>.</a:t>
-            </a:r>
-          </a:p>
-          <a:p>
-            <a:endParaRPr lang="hu-HU" dirty="0"/>
+              <a:t>(kivétel, ha kard)</a:t>
+            </a:r>
+          </a:p>
+          <a:p>
+            <a:r>
+              <a:rPr lang="hu-HU" dirty="0"/>
+              <a:t>Ha nem tudjuk lerakni egyik kártyán lévő elemet se, akkor passzolnunk kell.</a:t>
+            </a:r>
           </a:p>
           <a:p>
             <a:pPr marL="0" indent="0">
@@ -6693,18 +6624,12 @@
               <a:rPr lang="hu-HU" dirty="0"/>
               <a:t> </a:t>
             </a:r>
-            <a:endParaRPr lang="hu-HU" dirty="0" smtClean="0"/>
-          </a:p>
-          <a:p>
-            <a:r>
-              <a:rPr lang="hu-HU" dirty="0" smtClean="0"/>
-              <a:t>A </a:t>
-            </a:r>
+          </a:p>
+          <a:p>
             <a:r>
               <a:rPr lang="hu-HU" dirty="0"/>
-              <a:t>játéknak akkor van vége, ha mind a két játékos egymás után kétszer passzol.</a:t>
-            </a:r>
-            <a:endParaRPr lang="hu-HU" dirty="0"/>
+              <a:t>A játéknak akkor van vége, ha mind a két játékos egymás után kétszer passzol.</a:t>
+            </a:r>
           </a:p>
         </p:txBody>
       </p:sp>
@@ -6718,13 +6643,6 @@
   <p:clrMapOvr>
     <a:masterClrMapping/>
   </p:clrMapOvr>
-  <p:timing>
-    <p:tnLst>
-      <p:par>
-        <p:cTn id="1" dur="indefinite" restart="never" nodeType="tmRoot"/>
-      </p:par>
-    </p:tnLst>
-  </p:timing>
 </p:sld>
 </file>
 
@@ -6761,10 +6679,9 @@
           <a:lstStyle/>
           <a:p>
             <a:r>
-              <a:rPr lang="hu-HU" dirty="0" smtClean="0"/>
+              <a:rPr lang="hu-HU" dirty="0"/>
               <a:t>Feladatok</a:t>
             </a:r>
-            <a:endParaRPr lang="hu-HU" dirty="0"/>
           </a:p>
         </p:txBody>
       </p:sp>
@@ -6778,7 +6695,12 @@
             <p:ph idx="1"/>
           </p:nvPr>
         </p:nvSpPr>
-        <p:spPr/>
+        <p:spPr>
+          <a:xfrm>
+            <a:off x="1103312" y="2035500"/>
+            <a:ext cx="8946541" cy="4195481"/>
+          </a:xfrm>
+        </p:spPr>
         <p:txBody>
           <a:bodyPr>
             <a:normAutofit/>
@@ -6789,44 +6711,72 @@
               <a:buNone/>
             </a:pPr>
             <a:r>
-              <a:rPr lang="hu-HU" sz="2400" b="1" dirty="0" smtClean="0"/>
+              <a:rPr lang="hu-HU" sz="2400" b="1" dirty="0"/>
+              <a:t>Zsombor: </a:t>
+            </a:r>
+          </a:p>
+          <a:p>
+            <a:r>
+              <a:rPr lang="hu-HU" dirty="0"/>
+              <a:t>Pálya és akadályok generálása</a:t>
+            </a:r>
+          </a:p>
+          <a:p>
+            <a:r>
+              <a:rPr lang="hu-HU" dirty="0"/>
+              <a:t>PPT összeállítása</a:t>
+            </a:r>
+          </a:p>
+          <a:p>
+            <a:pPr marL="0" indent="0">
+              <a:buNone/>
+            </a:pPr>
+            <a:r>
+              <a:rPr lang="hu-HU" sz="2400" b="1" dirty="0" err="1"/>
+              <a:t>Teddi</a:t>
+            </a:r>
+            <a:r>
+              <a:rPr lang="hu-HU" sz="2400" b="1" dirty="0"/>
+              <a:t>:</a:t>
+            </a:r>
+          </a:p>
+          <a:p>
+            <a:r>
+              <a:rPr lang="hu-HU" dirty="0"/>
+              <a:t>Kártyahúzás</a:t>
+            </a:r>
+          </a:p>
+          <a:p>
+            <a:r>
+              <a:rPr lang="hu-HU" dirty="0"/>
+              <a:t>Kinézet + </a:t>
+            </a:r>
+            <a:r>
+              <a:rPr lang="hu-HU" dirty="0" err="1"/>
+              <a:t>reszponzivitás</a:t>
+            </a:r>
+            <a:endParaRPr lang="hu-HU" dirty="0"/>
+          </a:p>
+          <a:p>
+            <a:r>
+              <a:rPr lang="hu-HU" dirty="0"/>
+              <a:t>ÁCBÉ</a:t>
+            </a:r>
+          </a:p>
+          <a:p>
+            <a:pPr marL="0" indent="0">
+              <a:buNone/>
+            </a:pPr>
+            <a:r>
+              <a:rPr lang="hu-HU" b="1" dirty="0"/>
               <a:t>Bálint:</a:t>
             </a:r>
           </a:p>
           <a:p>
-            <a:endParaRPr lang="hu-HU" sz="2400" b="1" dirty="0"/>
-          </a:p>
-          <a:p>
-            <a:pPr marL="0" indent="0">
-              <a:buNone/>
-            </a:pPr>
-            <a:r>
-              <a:rPr lang="hu-HU" sz="2400" b="1" dirty="0" err="1" smtClean="0"/>
-              <a:t>Teddi</a:t>
-            </a:r>
-            <a:r>
-              <a:rPr lang="hu-HU" sz="2400" b="1" dirty="0" smtClean="0"/>
-              <a:t>:</a:t>
-            </a:r>
-          </a:p>
-          <a:p>
-            <a:endParaRPr lang="hu-HU" sz="2400" b="1" dirty="0"/>
-          </a:p>
-          <a:p>
-            <a:pPr marL="0" indent="0">
-              <a:buNone/>
-            </a:pPr>
-            <a:r>
-              <a:rPr lang="hu-HU" sz="2400" b="1" dirty="0" smtClean="0"/>
-              <a:t>Zsombor: </a:t>
-            </a:r>
-          </a:p>
-          <a:p>
-            <a:r>
-              <a:rPr lang="hu-HU" dirty="0" smtClean="0"/>
-              <a:t>pálya és akadályok generálása</a:t>
-            </a:r>
-            <a:endParaRPr lang="hu-HU" dirty="0"/>
+            <a:r>
+              <a:rPr lang="hu-HU" dirty="0"/>
+              <a:t>Minden más</a:t>
+            </a:r>
           </a:p>
         </p:txBody>
       </p:sp>
@@ -6840,13 +6790,6 @@
   <p:clrMapOvr>
     <a:masterClrMapping/>
   </p:clrMapOvr>
-  <p:timing>
-    <p:tnLst>
-      <p:par>
-        <p:cTn id="1" dur="indefinite" restart="never" nodeType="tmRoot"/>
-      </p:par>
-    </p:tnLst>
-  </p:timing>
 </p:sld>
 </file>
 
@@ -6883,10 +6826,9 @@
           <a:lstStyle/>
           <a:p>
             <a:r>
-              <a:rPr lang="hu-HU" dirty="0" smtClean="0"/>
+              <a:rPr lang="hu-HU" dirty="0"/>
               <a:t>Végeredmény</a:t>
             </a:r>
-            <a:endParaRPr lang="hu-HU" dirty="0"/>
           </a:p>
         </p:txBody>
       </p:sp>
@@ -6909,15 +6851,9 @@
               <a:rPr lang="hu-HU" dirty="0">
                 <a:hlinkClick r:id="rId2"/>
               </a:rPr>
-              <a:t>https://</a:t>
-            </a:r>
-            <a:r>
-              <a:rPr lang="hu-HU" dirty="0" smtClean="0">
-                <a:hlinkClick r:id="rId2"/>
-              </a:rPr>
-              <a:t>github.com/Balint837/Fantasy-Tetris-Game</a:t>
-            </a:r>
-            <a:endParaRPr lang="hu-HU" dirty="0" smtClean="0"/>
+              <a:t>https://github.com/Balint837/Fantasy-Tetris-Game</a:t>
+            </a:r>
+            <a:endParaRPr lang="hu-HU" dirty="0"/>
           </a:p>
         </p:txBody>
       </p:sp>
@@ -6931,13 +6867,6 @@
   <p:clrMapOvr>
     <a:masterClrMapping/>
   </p:clrMapOvr>
-  <p:timing>
-    <p:tnLst>
-      <p:par>
-        <p:cTn id="1" dur="indefinite" restart="never" nodeType="tmRoot"/>
-      </p:par>
-    </p:tnLst>
-  </p:timing>
 </p:sld>
 </file>
 

</xml_diff>